<commit_message>
Poster ready, committing everything.
</commit_message>
<xml_diff>
--- a/doc/poster.pptx
+++ b/doc/poster.pptx
@@ -277,11 +277,11 @@
           <c:showBubbleSize val="0"/>
         </c:dLbls>
         <c:gapWidth val="14"/>
-        <c:axId val="79131392"/>
-        <c:axId val="79134080"/>
+        <c:axId val="20916864"/>
+        <c:axId val="22307968"/>
       </c:barChart>
       <c:catAx>
-        <c:axId val="79131392"/>
+        <c:axId val="20916864"/>
         <c:scaling>
           <c:orientation val="minMax"/>
         </c:scaling>
@@ -297,12 +297,28 @@
                   <a:defRPr/>
                 </a:pPr>
                 <a:r>
-                  <a:rPr lang="et-EE" b="0">
+                  <a:rPr lang="et-EE" b="0" dirty="0">
                     <a:latin typeface="Open Sans Semibold" panose="020B0706030804020204" pitchFamily="34" charset="0"/>
                     <a:ea typeface="Open Sans Semibold" panose="020B0706030804020204" pitchFamily="34" charset="0"/>
                     <a:cs typeface="Open Sans Semibold" panose="020B0706030804020204" pitchFamily="34" charset="0"/>
                   </a:rPr>
-                  <a:t>Number of diagnoses</a:t>
+                  <a:t>Number of</a:t>
+                </a:r>
+                <a:r>
+                  <a:rPr lang="et-EE" b="0" baseline="0" dirty="0">
+                    <a:latin typeface="Open Sans Semibold" panose="020B0706030804020204" pitchFamily="34" charset="0"/>
+                    <a:ea typeface="Open Sans Semibold" panose="020B0706030804020204" pitchFamily="34" charset="0"/>
+                    <a:cs typeface="Open Sans Semibold" panose="020B0706030804020204" pitchFamily="34" charset="0"/>
+                  </a:rPr>
+                  <a:t> </a:t>
+                </a:r>
+                <a:r>
+                  <a:rPr lang="et-EE" b="0" dirty="0">
+                    <a:latin typeface="Open Sans Semibold" panose="020B0706030804020204" pitchFamily="34" charset="0"/>
+                    <a:ea typeface="Open Sans Semibold" panose="020B0706030804020204" pitchFamily="34" charset="0"/>
+                    <a:cs typeface="Open Sans Semibold" panose="020B0706030804020204" pitchFamily="34" charset="0"/>
+                  </a:rPr>
+                  <a:t>different diagnoses</a:t>
                 </a:r>
               </a:p>
             </c:rich>
@@ -313,7 +329,7 @@
         <c:majorTickMark val="out"/>
         <c:minorTickMark val="none"/>
         <c:tickLblPos val="nextTo"/>
-        <c:crossAx val="79134080"/>
+        <c:crossAx val="22307968"/>
         <c:crosses val="autoZero"/>
         <c:auto val="1"/>
         <c:lblAlgn val="ctr"/>
@@ -322,7 +338,7 @@
         <c:noMultiLvlLbl val="0"/>
       </c:catAx>
       <c:valAx>
-        <c:axId val="79134080"/>
+        <c:axId val="22307968"/>
         <c:scaling>
           <c:orientation val="minMax"/>
           <c:max val="8000"/>
@@ -333,11 +349,7 @@
         <c:majorGridlines>
           <c:spPr>
             <a:ln>
-              <a:solidFill>
-                <a:schemeClr val="bg1">
-                  <a:lumMod val="85000"/>
-                </a:schemeClr>
-              </a:solidFill>
+              <a:noFill/>
             </a:ln>
           </c:spPr>
         </c:majorGridlines>
@@ -365,8 +377,8 @@
             <c:manualLayout>
               <c:xMode val="edge"/>
               <c:yMode val="edge"/>
-              <c:x val="3.5307869022196338E-3"/>
-              <c:y val="9.1246863799283165E-2"/>
+              <c:x val="5.4138503739476268E-3"/>
+              <c:y val="0.17677301940467555"/>
             </c:manualLayout>
           </c:layout>
           <c:overlay val="0"/>
@@ -375,7 +387,7 @@
         <c:majorTickMark val="out"/>
         <c:minorTickMark val="none"/>
         <c:tickLblPos val="nextTo"/>
-        <c:crossAx val="79131392"/>
+        <c:crossAx val="20916864"/>
         <c:crossesAt val="1"/>
         <c:crossBetween val="between"/>
         <c:majorUnit val="4000"/>
@@ -3824,6 +3836,55 @@
       </p:grpSpPr>
       <p:sp>
         <p:nvSpPr>
+          <p:cNvPr id="8" name="Rectangle 7"/>
+          <p:cNvSpPr/>
+          <p:nvPr/>
+        </p:nvSpPr>
+        <p:spPr>
+          <a:xfrm>
+            <a:off x="-1" y="4852987"/>
+            <a:ext cx="42808526" cy="2285999"/>
+          </a:xfrm>
+          <a:prstGeom prst="rect">
+            <a:avLst/>
+          </a:prstGeom>
+          <a:solidFill>
+            <a:schemeClr val="bg1">
+              <a:lumMod val="95000"/>
+            </a:schemeClr>
+          </a:solidFill>
+          <a:ln>
+            <a:noFill/>
+          </a:ln>
+          <a:effectLst/>
+        </p:spPr>
+        <p:style>
+          <a:lnRef idx="2">
+            <a:schemeClr val="accent1">
+              <a:shade val="50000"/>
+            </a:schemeClr>
+          </a:lnRef>
+          <a:fillRef idx="1">
+            <a:schemeClr val="accent1"/>
+          </a:fillRef>
+          <a:effectRef idx="0">
+            <a:schemeClr val="accent1"/>
+          </a:effectRef>
+          <a:fontRef idx="minor">
+            <a:schemeClr val="lt1"/>
+          </a:fontRef>
+        </p:style>
+        <p:txBody>
+          <a:bodyPr rtlCol="0" anchor="ctr"/>
+          <a:lstStyle/>
+          <a:p>
+            <a:pPr algn="ctr"/>
+            <a:endParaRPr lang="et-EE"/>
+          </a:p>
+        </p:txBody>
+      </p:sp>
+      <p:sp>
+        <p:nvSpPr>
           <p:cNvPr id="5" name="Rectangle 4"/>
           <p:cNvSpPr/>
           <p:nvPr/>
@@ -3895,7 +3956,7 @@
         </p:blipFill>
         <p:spPr bwMode="auto">
           <a:xfrm>
-            <a:off x="36339462" y="1604961"/>
+            <a:off x="36339462" y="3948112"/>
             <a:ext cx="6972300" cy="4048125"/>
           </a:xfrm>
           <a:prstGeom prst="rect">
@@ -3953,62 +4014,21 @@
                 <a:ea typeface="Open Sans Semibold" panose="020B0706030804020204" pitchFamily="34" charset="0"/>
                 <a:cs typeface="Open Sans Semibold" panose="020B0706030804020204" pitchFamily="34" charset="0"/>
               </a:rPr>
-              <a:t>medical diagnoses</a:t>
+              <a:t>medical </a:t>
+            </a:r>
+            <a:r>
+              <a:rPr lang="et-EE" sz="12000" dirty="0" smtClean="0">
+                <a:latin typeface="Open Sans Semibold" panose="020B0706030804020204" pitchFamily="34" charset="0"/>
+                <a:ea typeface="Open Sans Semibold" panose="020B0706030804020204" pitchFamily="34" charset="0"/>
+                <a:cs typeface="Open Sans Semibold" panose="020B0706030804020204" pitchFamily="34" charset="0"/>
+              </a:rPr>
+              <a:t>diagnoses</a:t>
             </a:r>
             <a:endParaRPr lang="et-EE" sz="12000" dirty="0">
               <a:latin typeface="Open Sans Semibold" panose="020B0706030804020204" pitchFamily="34" charset="0"/>
               <a:ea typeface="Open Sans Semibold" panose="020B0706030804020204" pitchFamily="34" charset="0"/>
               <a:cs typeface="Open Sans Semibold" panose="020B0706030804020204" pitchFamily="34" charset="0"/>
             </a:endParaRPr>
-          </a:p>
-        </p:txBody>
-      </p:sp>
-      <p:sp>
-        <p:nvSpPr>
-          <p:cNvPr id="8" name="Rectangle 7"/>
-          <p:cNvSpPr/>
-          <p:nvPr/>
-        </p:nvSpPr>
-        <p:spPr>
-          <a:xfrm>
-            <a:off x="-1" y="4852987"/>
-            <a:ext cx="42808526" cy="2285999"/>
-          </a:xfrm>
-          <a:prstGeom prst="rect">
-            <a:avLst/>
-          </a:prstGeom>
-          <a:solidFill>
-            <a:schemeClr val="bg1">
-              <a:lumMod val="95000"/>
-            </a:schemeClr>
-          </a:solidFill>
-          <a:ln>
-            <a:noFill/>
-          </a:ln>
-          <a:effectLst/>
-        </p:spPr>
-        <p:style>
-          <a:lnRef idx="2">
-            <a:schemeClr val="accent1">
-              <a:shade val="50000"/>
-            </a:schemeClr>
-          </a:lnRef>
-          <a:fillRef idx="1">
-            <a:schemeClr val="accent1"/>
-          </a:fillRef>
-          <a:effectRef idx="0">
-            <a:schemeClr val="accent1"/>
-          </a:effectRef>
-          <a:fontRef idx="minor">
-            <a:schemeClr val="lt1"/>
-          </a:fontRef>
-        </p:style>
-        <p:txBody>
-          <a:bodyPr rtlCol="0" anchor="ctr"/>
-          <a:lstStyle/>
-          <a:p>
-            <a:pPr algn="ctr"/>
-            <a:endParaRPr lang="et-EE"/>
           </a:p>
         </p:txBody>
       </p:sp>
@@ -4074,7 +4094,7 @@
         </p:blipFill>
         <p:spPr bwMode="auto">
           <a:xfrm>
-            <a:off x="227077" y="2783826"/>
+            <a:off x="322327" y="5203177"/>
             <a:ext cx="8202612" cy="1690393"/>
           </a:xfrm>
           <a:prstGeom prst="rect">
@@ -4131,30 +4151,6 @@
           </a:p>
         </p:txBody>
       </p:sp>
-      <p:graphicFrame>
-        <p:nvGraphicFramePr>
-          <p:cNvPr id="19" name="Chart 18"/>
-          <p:cNvGraphicFramePr>
-            <a:graphicFrameLocks/>
-          </p:cNvGraphicFramePr>
-          <p:nvPr>
-            <p:extLst>
-              <p:ext uri="{D42A27DB-BD31-4B8C-83A1-F6EECF244321}">
-                <p14:modId xmlns:p14="http://schemas.microsoft.com/office/powerpoint/2010/main" val="3217233103"/>
-              </p:ext>
-            </p:extLst>
-          </p:nvPr>
-        </p:nvGraphicFramePr>
-        <p:xfrm>
-          <a:off x="29461332" y="22988587"/>
-          <a:ext cx="12362400" cy="6696000"/>
-        </p:xfrm>
-        <a:graphic>
-          <a:graphicData uri="http://schemas.openxmlformats.org/drawingml/2006/chart">
-            <c:chart xmlns:c="http://schemas.openxmlformats.org/drawingml/2006/chart" xmlns:r="http://schemas.openxmlformats.org/officeDocument/2006/relationships" r:id="rId5"/>
-          </a:graphicData>
-        </a:graphic>
-      </p:graphicFrame>
       <p:grpSp>
         <p:nvGrpSpPr>
           <p:cNvPr id="44" name="Group 43"/>
@@ -4163,10 +4159,10 @@
         </p:nvGrpSpPr>
         <p:grpSpPr>
           <a:xfrm>
-            <a:off x="531879" y="8356984"/>
-            <a:ext cx="13480984" cy="17843909"/>
+            <a:off x="28649678" y="8026836"/>
+            <a:ext cx="13480984" cy="12457820"/>
             <a:chOff x="819274" y="7672387"/>
-            <a:chExt cx="12362404" cy="17843909"/>
+            <a:chExt cx="12362404" cy="12457820"/>
           </a:xfrm>
         </p:grpSpPr>
         <p:sp>
@@ -4197,17 +4193,17 @@
             <a:p>
               <a:pPr algn="ctr"/>
               <a:r>
-                <a:rPr lang="et-EE" sz="7000" dirty="0" smtClean="0">
-                  <a:latin typeface="Open Sans Semibold" panose="020B0706030804020204" pitchFamily="34" charset="0"/>
-                  <a:ea typeface="Open Sans Semibold" panose="020B0706030804020204" pitchFamily="34" charset="0"/>
-                  <a:cs typeface="Open Sans Semibold" panose="020B0706030804020204" pitchFamily="34" charset="0"/>
+                <a:rPr lang="et-EE" sz="7000" b="1" dirty="0" smtClean="0">
+                  <a:latin typeface="Open Sans" panose="020B0606030504020204" pitchFamily="34" charset="0"/>
+                  <a:ea typeface="Open Sans" panose="020B0606030504020204" pitchFamily="34" charset="0"/>
+                  <a:cs typeface="Open Sans" panose="020B0606030504020204" pitchFamily="34" charset="0"/>
                 </a:rPr>
                 <a:t>Data</a:t>
               </a:r>
-              <a:endParaRPr lang="et-EE" sz="7000" dirty="0">
-                <a:latin typeface="Open Sans Semibold" panose="020B0706030804020204" pitchFamily="34" charset="0"/>
-                <a:ea typeface="Open Sans Semibold" panose="020B0706030804020204" pitchFamily="34" charset="0"/>
-                <a:cs typeface="Open Sans Semibold" panose="020B0706030804020204" pitchFamily="34" charset="0"/>
+              <a:endParaRPr lang="et-EE" sz="7000" b="1" dirty="0">
+                <a:latin typeface="Open Sans" panose="020B0606030504020204" pitchFamily="34" charset="0"/>
+                <a:ea typeface="Open Sans" panose="020B0606030504020204" pitchFamily="34" charset="0"/>
+                <a:cs typeface="Open Sans" panose="020B0606030504020204" pitchFamily="34" charset="0"/>
               </a:endParaRPr>
             </a:p>
           </p:txBody>
@@ -4221,7 +4217,387 @@
           <p:spPr>
             <a:xfrm>
               <a:off x="819274" y="9400437"/>
-              <a:ext cx="12362403" cy="16115859"/>
+              <a:ext cx="12362403" cy="10729770"/>
+            </a:xfrm>
+            <a:prstGeom prst="rect">
+              <a:avLst/>
+            </a:prstGeom>
+            <a:noFill/>
+          </p:spPr>
+          <p:txBody>
+            <a:bodyPr wrap="square" lIns="360000" tIns="360000" rIns="360000" bIns="360000" rtlCol="0">
+              <a:spAutoFit/>
+            </a:bodyPr>
+            <a:lstStyle/>
+            <a:p>
+              <a:pPr algn="just"/>
+              <a:r>
+                <a:rPr lang="et-EE" sz="5000" dirty="0" smtClean="0">
+                  <a:latin typeface="Open Sans" panose="020B0606030504020204" pitchFamily="34" charset="0"/>
+                  <a:ea typeface="Open Sans" panose="020B0606030504020204" pitchFamily="34" charset="0"/>
+                  <a:cs typeface="Open Sans" panose="020B0606030504020204" pitchFamily="34" charset="0"/>
+                </a:rPr>
+                <a:t>The input data, consisting of patients’ genders, ages and diagnosis histories, was </a:t>
+              </a:r>
+              <a:r>
+                <a:rPr lang="et-EE" sz="5000" dirty="0" smtClean="0">
+                  <a:latin typeface="Open Sans" panose="020B0606030504020204" pitchFamily="34" charset="0"/>
+                  <a:ea typeface="Open Sans" panose="020B0606030504020204" pitchFamily="34" charset="0"/>
+                  <a:cs typeface="Open Sans" panose="020B0606030504020204" pitchFamily="34" charset="0"/>
+                </a:rPr>
+                <a:t>filtered.</a:t>
+              </a:r>
+              <a:endParaRPr lang="et-EE" sz="5000" dirty="0" smtClean="0">
+                <a:latin typeface="Open Sans" panose="020B0606030504020204" pitchFamily="34" charset="0"/>
+                <a:ea typeface="Open Sans" panose="020B0606030504020204" pitchFamily="34" charset="0"/>
+                <a:cs typeface="Open Sans" panose="020B0606030504020204" pitchFamily="34" charset="0"/>
+              </a:endParaRPr>
+            </a:p>
+            <a:p>
+              <a:pPr algn="just">
+                <a:spcBef>
+                  <a:spcPts val="2000"/>
+                </a:spcBef>
+              </a:pPr>
+              <a:r>
+                <a:rPr lang="et-EE" sz="5000" dirty="0" smtClean="0">
+                  <a:latin typeface="Open Sans" panose="020B0606030504020204" pitchFamily="34" charset="0"/>
+                  <a:ea typeface="Open Sans" panose="020B0606030504020204" pitchFamily="34" charset="0"/>
+                  <a:cs typeface="Open Sans" panose="020B0606030504020204" pitchFamily="34" charset="0"/>
+                </a:rPr>
+                <a:t>Ages were assigned into 8 bins with edges at 0, 20, 30, 40, 50, 60, 70, 80, 100 </a:t>
+              </a:r>
+              <a:r>
+                <a:rPr lang="et-EE" sz="5000" dirty="0" smtClean="0">
+                  <a:latin typeface="Open Sans" panose="020B0606030504020204" pitchFamily="34" charset="0"/>
+                  <a:ea typeface="Open Sans" panose="020B0606030504020204" pitchFamily="34" charset="0"/>
+                  <a:cs typeface="Open Sans" panose="020B0606030504020204" pitchFamily="34" charset="0"/>
+                </a:rPr>
+                <a:t>years.</a:t>
+              </a:r>
+            </a:p>
+            <a:p>
+              <a:pPr algn="just">
+                <a:spcBef>
+                  <a:spcPts val="2000"/>
+                </a:spcBef>
+              </a:pPr>
+              <a:r>
+                <a:rPr lang="et-EE" sz="5000" dirty="0" smtClean="0">
+                  <a:latin typeface="Open Sans" panose="020B0606030504020204" pitchFamily="34" charset="0"/>
+                  <a:ea typeface="Open Sans" panose="020B0606030504020204" pitchFamily="34" charset="0"/>
+                  <a:cs typeface="Open Sans" panose="020B0606030504020204" pitchFamily="34" charset="0"/>
+                </a:rPr>
+                <a:t>The </a:t>
+              </a:r>
+              <a:r>
+                <a:rPr lang="et-EE" sz="5000" dirty="0" smtClean="0">
+                  <a:latin typeface="Open Sans" panose="020B0606030504020204" pitchFamily="34" charset="0"/>
+                  <a:ea typeface="Open Sans" panose="020B0606030504020204" pitchFamily="34" charset="0"/>
+                  <a:cs typeface="Open Sans" panose="020B0606030504020204" pitchFamily="34" charset="0"/>
+                </a:rPr>
+                <a:t>original diagnosis histories, lists of Estonian RHK-10 </a:t>
+              </a:r>
+              <a:r>
+                <a:rPr lang="et-EE" sz="5000" dirty="0" smtClean="0">
+                  <a:latin typeface="Open Sans" panose="020B0606030504020204" pitchFamily="34" charset="0"/>
+                  <a:ea typeface="Open Sans" panose="020B0606030504020204" pitchFamily="34" charset="0"/>
+                  <a:cs typeface="Open Sans" panose="020B0606030504020204" pitchFamily="34" charset="0"/>
+                </a:rPr>
+                <a:t>codes (e.g. ‘G01’), were transformed </a:t>
+              </a:r>
+              <a:r>
+                <a:rPr lang="et-EE" sz="5000" dirty="0" smtClean="0">
+                  <a:latin typeface="Open Sans" panose="020B0606030504020204" pitchFamily="34" charset="0"/>
+                  <a:ea typeface="Open Sans" panose="020B0606030504020204" pitchFamily="34" charset="0"/>
+                  <a:cs typeface="Open Sans" panose="020B0606030504020204" pitchFamily="34" charset="0"/>
+                </a:rPr>
+                <a:t>into </a:t>
+              </a:r>
+              <a:r>
+                <a:rPr lang="et-EE" sz="5000" dirty="0" smtClean="0">
+                  <a:latin typeface="Open Sans" panose="020B0606030504020204" pitchFamily="34" charset="0"/>
+                  <a:ea typeface="Open Sans" panose="020B0606030504020204" pitchFamily="34" charset="0"/>
+                  <a:cs typeface="Open Sans" panose="020B0606030504020204" pitchFamily="34" charset="0"/>
+                </a:rPr>
+                <a:t>binary vectors.</a:t>
+              </a:r>
+              <a:endParaRPr lang="et-EE" sz="5000" dirty="0" smtClean="0">
+                <a:latin typeface="Open Sans" panose="020B0606030504020204" pitchFamily="34" charset="0"/>
+                <a:ea typeface="Open Sans" panose="020B0606030504020204" pitchFamily="34" charset="0"/>
+                <a:cs typeface="Open Sans" panose="020B0606030504020204" pitchFamily="34" charset="0"/>
+              </a:endParaRPr>
+            </a:p>
+            <a:p>
+              <a:pPr algn="just">
+                <a:spcBef>
+                  <a:spcPts val="2000"/>
+                </a:spcBef>
+              </a:pPr>
+              <a:r>
+                <a:rPr lang="et-EE" sz="5000" dirty="0" smtClean="0">
+                  <a:latin typeface="Open Sans" panose="020B0606030504020204" pitchFamily="34" charset="0"/>
+                  <a:ea typeface="Open Sans" panose="020B0606030504020204" pitchFamily="34" charset="0"/>
+                  <a:cs typeface="Open Sans" panose="020B0606030504020204" pitchFamily="34" charset="0"/>
+                </a:rPr>
+                <a:t>After preprocessing, a sample of 48 728 patients was left. This data was partitioned into training (60%), validation (20%) and test (20%) sets.</a:t>
+              </a:r>
+              <a:endParaRPr lang="et-EE" sz="5000" dirty="0">
+                <a:latin typeface="Open Sans" panose="020B0606030504020204" pitchFamily="34" charset="0"/>
+                <a:ea typeface="Open Sans" panose="020B0606030504020204" pitchFamily="34" charset="0"/>
+                <a:cs typeface="Open Sans" panose="020B0606030504020204" pitchFamily="34" charset="0"/>
+              </a:endParaRPr>
+            </a:p>
+          </p:txBody>
+        </p:sp>
+      </p:grpSp>
+      <p:grpSp>
+        <p:nvGrpSpPr>
+          <p:cNvPr id="47" name="Group 46"/>
+          <p:cNvGrpSpPr/>
+          <p:nvPr/>
+        </p:nvGrpSpPr>
+        <p:grpSpPr>
+          <a:xfrm>
+            <a:off x="690695" y="17728889"/>
+            <a:ext cx="13480984" cy="11431898"/>
+            <a:chOff x="819274" y="7672387"/>
+            <a:chExt cx="12362404" cy="11431898"/>
+          </a:xfrm>
+        </p:grpSpPr>
+        <p:sp>
+          <p:nvSpPr>
+            <p:cNvPr id="48" name="TextBox 47"/>
+            <p:cNvSpPr txBox="1"/>
+            <p:nvPr/>
+          </p:nvSpPr>
+          <p:spPr>
+            <a:xfrm>
+              <a:off x="819275" y="7672387"/>
+              <a:ext cx="12362403" cy="1440734"/>
+            </a:xfrm>
+            <a:prstGeom prst="rect">
+              <a:avLst/>
+            </a:prstGeom>
+            <a:solidFill>
+              <a:schemeClr val="bg2">
+                <a:lumMod val="90000"/>
+              </a:schemeClr>
+            </a:solidFill>
+          </p:spPr>
+          <p:txBody>
+            <a:bodyPr wrap="square" lIns="360000" tIns="180000" rIns="360000" bIns="180000" rtlCol="0">
+              <a:spAutoFit/>
+            </a:bodyPr>
+            <a:lstStyle/>
+            <a:p>
+              <a:pPr algn="ctr"/>
+              <a:r>
+                <a:rPr lang="et-EE" sz="7000" b="1" dirty="0" smtClean="0">
+                  <a:latin typeface="Open Sans" panose="020B0606030504020204" pitchFamily="34" charset="0"/>
+                  <a:ea typeface="Open Sans" panose="020B0606030504020204" pitchFamily="34" charset="0"/>
+                  <a:cs typeface="Open Sans" panose="020B0606030504020204" pitchFamily="34" charset="0"/>
+                </a:rPr>
+                <a:t>Methods</a:t>
+              </a:r>
+              <a:endParaRPr lang="et-EE" sz="7000" b="1" dirty="0">
+                <a:latin typeface="Open Sans" panose="020B0606030504020204" pitchFamily="34" charset="0"/>
+                <a:ea typeface="Open Sans" panose="020B0606030504020204" pitchFamily="34" charset="0"/>
+                <a:cs typeface="Open Sans" panose="020B0606030504020204" pitchFamily="34" charset="0"/>
+              </a:endParaRPr>
+            </a:p>
+          </p:txBody>
+        </p:sp>
+        <p:sp>
+          <p:nvSpPr>
+            <p:cNvPr id="49" name="TextBox 48"/>
+            <p:cNvSpPr txBox="1"/>
+            <p:nvPr/>
+          </p:nvSpPr>
+          <p:spPr>
+            <a:xfrm>
+              <a:off x="819274" y="9400437"/>
+              <a:ext cx="12362403" cy="9703848"/>
+            </a:xfrm>
+            <a:prstGeom prst="rect">
+              <a:avLst/>
+            </a:prstGeom>
+            <a:noFill/>
+          </p:spPr>
+          <p:txBody>
+            <a:bodyPr wrap="square" lIns="360000" tIns="360000" rIns="360000" bIns="360000" rtlCol="0">
+              <a:spAutoFit/>
+            </a:bodyPr>
+            <a:lstStyle/>
+            <a:p>
+              <a:pPr algn="just"/>
+              <a:r>
+                <a:rPr lang="et-EE" sz="5000" dirty="0" smtClean="0">
+                  <a:latin typeface="Open Sans" panose="020B0606030504020204" pitchFamily="34" charset="0"/>
+                  <a:ea typeface="Open Sans" panose="020B0606030504020204" pitchFamily="34" charset="0"/>
+                  <a:cs typeface="Open Sans" panose="020B0606030504020204" pitchFamily="34" charset="0"/>
+                </a:rPr>
+                <a:t>Input data was cleansed and preprocessed as explained in section Data.</a:t>
+              </a:r>
+            </a:p>
+            <a:p>
+              <a:pPr algn="just">
+                <a:spcBef>
+                  <a:spcPts val="2000"/>
+                </a:spcBef>
+              </a:pPr>
+              <a:r>
+                <a:rPr lang="et-EE" sz="5000" dirty="0" smtClean="0">
+                  <a:latin typeface="Open Sans" panose="020B0606030504020204" pitchFamily="34" charset="0"/>
+                  <a:ea typeface="Open Sans" panose="020B0606030504020204" pitchFamily="34" charset="0"/>
+                  <a:cs typeface="Open Sans" panose="020B0606030504020204" pitchFamily="34" charset="0"/>
+                </a:rPr>
+                <a:t>Before analysis, </a:t>
+              </a:r>
+              <a:r>
+                <a:rPr lang="et-EE" sz="5000" dirty="0" smtClean="0">
+                  <a:latin typeface="Open Sans" panose="020B0606030504020204" pitchFamily="34" charset="0"/>
+                  <a:ea typeface="Open Sans" panose="020B0606030504020204" pitchFamily="34" charset="0"/>
+                  <a:cs typeface="Open Sans" panose="020B0606030504020204" pitchFamily="34" charset="0"/>
+                </a:rPr>
+                <a:t>PCA </a:t>
+              </a:r>
+              <a:r>
+                <a:rPr lang="et-EE" sz="5000" dirty="0" smtClean="0">
+                  <a:latin typeface="Open Sans" panose="020B0606030504020204" pitchFamily="34" charset="0"/>
+                  <a:ea typeface="Open Sans" panose="020B0606030504020204" pitchFamily="34" charset="0"/>
+                  <a:cs typeface="Open Sans" panose="020B0606030504020204" pitchFamily="34" charset="0"/>
+                </a:rPr>
+                <a:t>was conducted on the diagnoses matrix. </a:t>
+              </a:r>
+              <a:r>
+                <a:rPr lang="et-EE" sz="5000" dirty="0" smtClean="0">
+                  <a:latin typeface="Open Sans" panose="020B0606030504020204" pitchFamily="34" charset="0"/>
+                  <a:ea typeface="Open Sans" panose="020B0606030504020204" pitchFamily="34" charset="0"/>
+                  <a:cs typeface="Open Sans" panose="020B0606030504020204" pitchFamily="34" charset="0"/>
+                </a:rPr>
+                <a:t>The number of principal components was chosen so that the explained variance would be 0.9. This criterion produced a 249-dimensional space, into which the original data was transformed for further analysis.</a:t>
+              </a:r>
+              <a:endParaRPr lang="et-EE" sz="5000" dirty="0">
+                <a:latin typeface="Open Sans" panose="020B0606030504020204" pitchFamily="34" charset="0"/>
+                <a:ea typeface="Open Sans" panose="020B0606030504020204" pitchFamily="34" charset="0"/>
+                <a:cs typeface="Open Sans" panose="020B0606030504020204" pitchFamily="34" charset="0"/>
+              </a:endParaRPr>
+            </a:p>
+            <a:p>
+              <a:pPr algn="just">
+                <a:spcBef>
+                  <a:spcPts val="2000"/>
+                </a:spcBef>
+              </a:pPr>
+              <a:r>
+                <a:rPr lang="et-EE" sz="5000" dirty="0">
+                  <a:latin typeface="Open Sans" panose="020B0606030504020204" pitchFamily="34" charset="0"/>
+                  <a:ea typeface="Open Sans" panose="020B0606030504020204" pitchFamily="34" charset="0"/>
+                  <a:cs typeface="Open Sans" panose="020B0606030504020204" pitchFamily="34" charset="0"/>
+                </a:rPr>
+                <a:t>Software </a:t>
+              </a:r>
+              <a:r>
+                <a:rPr lang="et-EE" sz="5000" dirty="0" smtClean="0">
+                  <a:latin typeface="Open Sans" panose="020B0606030504020204" pitchFamily="34" charset="0"/>
+                  <a:ea typeface="Open Sans" panose="020B0606030504020204" pitchFamily="34" charset="0"/>
+                  <a:cs typeface="Open Sans" panose="020B0606030504020204" pitchFamily="34" charset="0"/>
+                </a:rPr>
+                <a:t>used: </a:t>
+              </a:r>
+              <a:r>
+                <a:rPr lang="et-EE" sz="5000" dirty="0">
+                  <a:latin typeface="Open Sans" panose="020B0606030504020204" pitchFamily="34" charset="0"/>
+                  <a:ea typeface="Open Sans" panose="020B0606030504020204" pitchFamily="34" charset="0"/>
+                  <a:cs typeface="Open Sans" panose="020B0606030504020204" pitchFamily="34" charset="0"/>
+                </a:rPr>
+                <a:t>R; Python with packages Numpy and MDP</a:t>
+              </a:r>
+              <a:r>
+                <a:rPr lang="et-EE" sz="5000" dirty="0" smtClean="0">
+                  <a:latin typeface="Open Sans" panose="020B0606030504020204" pitchFamily="34" charset="0"/>
+                  <a:ea typeface="Open Sans" panose="020B0606030504020204" pitchFamily="34" charset="0"/>
+                  <a:cs typeface="Open Sans" panose="020B0606030504020204" pitchFamily="34" charset="0"/>
+                </a:rPr>
+                <a:t>.</a:t>
+              </a:r>
+              <a:endParaRPr lang="et-EE" sz="5000" dirty="0">
+                <a:latin typeface="Open Sans" panose="020B0606030504020204" pitchFamily="34" charset="0"/>
+                <a:ea typeface="Open Sans" panose="020B0606030504020204" pitchFamily="34" charset="0"/>
+                <a:cs typeface="Open Sans" panose="020B0606030504020204" pitchFamily="34" charset="0"/>
+              </a:endParaRPr>
+            </a:p>
+          </p:txBody>
+        </p:sp>
+      </p:grpSp>
+      <p:grpSp>
+        <p:nvGrpSpPr>
+          <p:cNvPr id="16" name="Group 15"/>
+          <p:cNvGrpSpPr/>
+          <p:nvPr/>
+        </p:nvGrpSpPr>
+        <p:grpSpPr>
+          <a:xfrm>
+            <a:off x="690694" y="8012493"/>
+            <a:ext cx="13480984" cy="9070594"/>
+            <a:chOff x="819274" y="7672387"/>
+            <a:chExt cx="12362404" cy="9070594"/>
+          </a:xfrm>
+        </p:grpSpPr>
+        <p:sp>
+          <p:nvSpPr>
+            <p:cNvPr id="17" name="TextBox 16"/>
+            <p:cNvSpPr txBox="1"/>
+            <p:nvPr/>
+          </p:nvSpPr>
+          <p:spPr>
+            <a:xfrm>
+              <a:off x="819275" y="7672387"/>
+              <a:ext cx="12362403" cy="1440734"/>
+            </a:xfrm>
+            <a:prstGeom prst="rect">
+              <a:avLst/>
+            </a:prstGeom>
+            <a:solidFill>
+              <a:schemeClr val="bg2">
+                <a:lumMod val="90000"/>
+              </a:schemeClr>
+            </a:solidFill>
+          </p:spPr>
+          <p:txBody>
+            <a:bodyPr wrap="square" lIns="360000" tIns="180000" rIns="360000" bIns="180000" rtlCol="0">
+              <a:spAutoFit/>
+            </a:bodyPr>
+            <a:lstStyle/>
+            <a:p>
+              <a:pPr algn="ctr"/>
+              <a:r>
+                <a:rPr lang="et-EE" sz="7000" b="1" dirty="0" smtClean="0">
+                  <a:latin typeface="Open Sans" panose="020B0606030504020204" pitchFamily="34" charset="0"/>
+                  <a:ea typeface="Open Sans" panose="020B0606030504020204" pitchFamily="34" charset="0"/>
+                  <a:cs typeface="Open Sans" panose="020B0606030504020204" pitchFamily="34" charset="0"/>
+                </a:rPr>
+                <a:t>Conclusions</a:t>
+              </a:r>
+              <a:endParaRPr lang="et-EE" sz="7000" b="1" dirty="0">
+                <a:latin typeface="Open Sans" panose="020B0606030504020204" pitchFamily="34" charset="0"/>
+                <a:ea typeface="Open Sans" panose="020B0606030504020204" pitchFamily="34" charset="0"/>
+                <a:cs typeface="Open Sans" panose="020B0606030504020204" pitchFamily="34" charset="0"/>
+              </a:endParaRPr>
+            </a:p>
+          </p:txBody>
+        </p:sp>
+        <p:sp>
+          <p:nvSpPr>
+            <p:cNvPr id="18" name="TextBox 17"/>
+            <p:cNvSpPr txBox="1"/>
+            <p:nvPr/>
+          </p:nvSpPr>
+          <p:spPr>
+            <a:xfrm>
+              <a:off x="819274" y="9603938"/>
+              <a:ext cx="12362403" cy="7139043"/>
             </a:xfrm>
             <a:prstGeom prst="rect">
               <a:avLst/>
@@ -4245,7 +4621,22 @@
                   <a:ea typeface="Open Sans" panose="020B0606030504020204" pitchFamily="34" charset="0"/>
                   <a:cs typeface="Open Sans" panose="020B0606030504020204" pitchFamily="34" charset="0"/>
                 </a:rPr>
-                <a:t>The </a:t>
+                <a:t>The methods tested in this study yielded prediction results better than random. However, the accuracy achieved is too low for useful applications.</a:t>
+              </a:r>
+            </a:p>
+            <a:p>
+              <a:pPr algn="just">
+                <a:spcBef>
+                  <a:spcPts val="2000"/>
+                </a:spcBef>
+              </a:pPr>
+              <a:r>
+                <a:rPr lang="et-EE" sz="5000" dirty="0">
+                  <a:latin typeface="Open Sans" panose="020B0606030504020204" pitchFamily="34" charset="0"/>
+                  <a:ea typeface="Open Sans" panose="020B0606030504020204" pitchFamily="34" charset="0"/>
+                  <a:cs typeface="Open Sans" panose="020B0606030504020204" pitchFamily="34" charset="0"/>
+                </a:rPr>
+                <a:t>R</a:t>
               </a:r>
               <a:r>
                 <a:rPr lang="et-EE" sz="5000" dirty="0" smtClean="0">
@@ -4253,7 +4644,15 @@
                   <a:ea typeface="Open Sans" panose="020B0606030504020204" pitchFamily="34" charset="0"/>
                   <a:cs typeface="Open Sans" panose="020B0606030504020204" pitchFamily="34" charset="0"/>
                 </a:rPr>
-                <a:t>input data, </a:t>
+                <a:t>estricting analysis to patients with at least some amount of diagnoses may improve results. Ensemble and neural network </a:t>
+              </a:r>
+              <a:r>
+                <a:rPr lang="et-EE" sz="5000" dirty="0">
+                  <a:latin typeface="Open Sans" panose="020B0606030504020204" pitchFamily="34" charset="0"/>
+                  <a:ea typeface="Open Sans" panose="020B0606030504020204" pitchFamily="34" charset="0"/>
+                  <a:cs typeface="Open Sans" panose="020B0606030504020204" pitchFamily="34" charset="0"/>
+                </a:rPr>
+                <a:t>methods</a:t>
               </a:r>
               <a:r>
                 <a:rPr lang="et-EE" sz="5000" dirty="0" smtClean="0">
@@ -4261,23 +4660,103 @@
                   <a:ea typeface="Open Sans" panose="020B0606030504020204" pitchFamily="34" charset="0"/>
                   <a:cs typeface="Open Sans" panose="020B0606030504020204" pitchFamily="34" charset="0"/>
                 </a:rPr>
-                <a:t>consisting of patients’ genders, ages and diagnosis histories, was </a:t>
-              </a:r>
-              <a:r>
-                <a:rPr lang="et-EE" sz="5000" dirty="0" smtClean="0">
-                  <a:latin typeface="Open Sans" panose="020B0606030504020204" pitchFamily="34" charset="0"/>
-                  <a:ea typeface="Open Sans" panose="020B0606030504020204" pitchFamily="34" charset="0"/>
-                  <a:cs typeface="Open Sans" panose="020B0606030504020204" pitchFamily="34" charset="0"/>
-                </a:rPr>
-                <a:t>filtered to remove patients with no diagnosis records and patients above the ages of 100</a:t>
-              </a:r>
-              <a:r>
-                <a:rPr lang="et-EE" sz="5000" dirty="0" smtClean="0">
-                  <a:latin typeface="Open Sans" panose="020B0606030504020204" pitchFamily="34" charset="0"/>
-                  <a:ea typeface="Open Sans" panose="020B0606030504020204" pitchFamily="34" charset="0"/>
-                  <a:cs typeface="Open Sans" panose="020B0606030504020204" pitchFamily="34" charset="0"/>
-                </a:rPr>
-                <a:t>.</a:t>
+                <a:t> should be tested as well.</a:t>
+              </a:r>
+            </a:p>
+          </p:txBody>
+        </p:sp>
+      </p:grpSp>
+      <p:grpSp>
+        <p:nvGrpSpPr>
+          <p:cNvPr id="20" name="Group 19"/>
+          <p:cNvGrpSpPr/>
+          <p:nvPr/>
+        </p:nvGrpSpPr>
+        <p:grpSpPr>
+          <a:xfrm>
+            <a:off x="14670185" y="8026836"/>
+            <a:ext cx="13480984" cy="21280748"/>
+            <a:chOff x="819274" y="7672387"/>
+            <a:chExt cx="12362404" cy="21280748"/>
+          </a:xfrm>
+        </p:grpSpPr>
+        <p:sp>
+          <p:nvSpPr>
+            <p:cNvPr id="21" name="TextBox 20"/>
+            <p:cNvSpPr txBox="1"/>
+            <p:nvPr/>
+          </p:nvSpPr>
+          <p:spPr>
+            <a:xfrm>
+              <a:off x="819275" y="7672387"/>
+              <a:ext cx="12362403" cy="1440734"/>
+            </a:xfrm>
+            <a:prstGeom prst="rect">
+              <a:avLst/>
+            </a:prstGeom>
+            <a:solidFill>
+              <a:schemeClr val="bg2">
+                <a:lumMod val="90000"/>
+              </a:schemeClr>
+            </a:solidFill>
+          </p:spPr>
+          <p:txBody>
+            <a:bodyPr wrap="square" lIns="360000" tIns="180000" rIns="360000" bIns="180000" rtlCol="0">
+              <a:spAutoFit/>
+            </a:bodyPr>
+            <a:lstStyle/>
+            <a:p>
+              <a:pPr algn="ctr"/>
+              <a:r>
+                <a:rPr lang="et-EE" sz="7000" b="1" dirty="0" smtClean="0">
+                  <a:latin typeface="Open Sans" panose="020B0606030504020204" pitchFamily="34" charset="0"/>
+                  <a:ea typeface="Open Sans" panose="020B0606030504020204" pitchFamily="34" charset="0"/>
+                  <a:cs typeface="Open Sans" panose="020B0606030504020204" pitchFamily="34" charset="0"/>
+                </a:rPr>
+                <a:t>Results</a:t>
+              </a:r>
+              <a:endParaRPr lang="et-EE" sz="7000" b="1" dirty="0">
+                <a:latin typeface="Open Sans" panose="020B0606030504020204" pitchFamily="34" charset="0"/>
+                <a:ea typeface="Open Sans" panose="020B0606030504020204" pitchFamily="34" charset="0"/>
+                <a:cs typeface="Open Sans" panose="020B0606030504020204" pitchFamily="34" charset="0"/>
+              </a:endParaRPr>
+            </a:p>
+          </p:txBody>
+        </p:sp>
+        <p:sp>
+          <p:nvSpPr>
+            <p:cNvPr id="22" name="TextBox 21"/>
+            <p:cNvSpPr txBox="1"/>
+            <p:nvPr/>
+          </p:nvSpPr>
+          <p:spPr>
+            <a:xfrm>
+              <a:off x="819274" y="9400437"/>
+              <a:ext cx="12362403" cy="19552698"/>
+            </a:xfrm>
+            <a:prstGeom prst="rect">
+              <a:avLst/>
+            </a:prstGeom>
+            <a:noFill/>
+          </p:spPr>
+          <p:txBody>
+            <a:bodyPr wrap="square" lIns="360000" tIns="360000" rIns="360000" bIns="360000" rtlCol="0">
+              <a:spAutoFit/>
+            </a:bodyPr>
+            <a:lstStyle/>
+            <a:p>
+              <a:pPr algn="just">
+                <a:spcAft>
+                  <a:spcPts val="2000"/>
+                </a:spcAft>
+              </a:pPr>
+              <a:r>
+                <a:rPr lang="et-EE" sz="7000" dirty="0">
+                  <a:latin typeface="Open Sans Semibold" panose="020B0706030804020204" pitchFamily="34" charset="0"/>
+                  <a:ea typeface="Open Sans Semibold" panose="020B0706030804020204" pitchFamily="34" charset="0"/>
+                  <a:cs typeface="Open Sans Semibold" panose="020B0706030804020204" pitchFamily="34" charset="0"/>
+                </a:rPr>
+                <a:t>Predicting gender</a:t>
               </a:r>
             </a:p>
             <a:p>
@@ -4288,7 +4767,184 @@
                   <a:ea typeface="Open Sans" panose="020B0606030504020204" pitchFamily="34" charset="0"/>
                   <a:cs typeface="Open Sans" panose="020B0606030504020204" pitchFamily="34" charset="0"/>
                 </a:rPr>
-                <a:t>Ages were assigned into 8 bins with edges at 0, 20, 30, 40, 50, 60, 70, 80, 100 years. This produced  bins containing 2000-7000 examples.</a:t>
+                <a:t>An extensive parameter probe was conducted on SVMs with linear and RBF kernels. Comparing models using validation set accuracy, the best model was selected.</a:t>
+              </a:r>
+            </a:p>
+            <a:p>
+              <a:pPr algn="just">
+                <a:spcBef>
+                  <a:spcPts val="2000"/>
+                </a:spcBef>
+              </a:pPr>
+              <a:r>
+                <a:rPr lang="et-EE" sz="5000" dirty="0" smtClean="0">
+                  <a:latin typeface="Open Sans" panose="020B0606030504020204" pitchFamily="34" charset="0"/>
+                  <a:ea typeface="Open Sans" panose="020B0606030504020204" pitchFamily="34" charset="0"/>
+                  <a:cs typeface="Open Sans" panose="020B0606030504020204" pitchFamily="34" charset="0"/>
+                </a:rPr>
+                <a:t>The best model (which used an RBF kernel) yielded a test set accuracy of </a:t>
+              </a:r>
+              <a:r>
+                <a:rPr lang="et-EE" sz="5000" b="1" dirty="0" smtClean="0">
+                  <a:latin typeface="Open Sans" panose="020B0606030504020204" pitchFamily="34" charset="0"/>
+                  <a:ea typeface="Open Sans" panose="020B0606030504020204" pitchFamily="34" charset="0"/>
+                  <a:cs typeface="Open Sans" panose="020B0606030504020204" pitchFamily="34" charset="0"/>
+                </a:rPr>
+                <a:t>69.6%</a:t>
+              </a:r>
+              <a:r>
+                <a:rPr lang="et-EE" sz="5000" dirty="0" smtClean="0">
+                  <a:latin typeface="Open Sans" panose="020B0606030504020204" pitchFamily="34" charset="0"/>
+                  <a:ea typeface="Open Sans" panose="020B0606030504020204" pitchFamily="34" charset="0"/>
+                  <a:cs typeface="Open Sans" panose="020B0606030504020204" pitchFamily="34" charset="0"/>
+                </a:rPr>
+                <a:t>, compared to a naive prediction accuracy of 56.0%. </a:t>
+              </a:r>
+              <a:r>
+                <a:rPr lang="et-EE" sz="5000" dirty="0">
+                  <a:latin typeface="Open Sans" panose="020B0606030504020204" pitchFamily="34" charset="0"/>
+                  <a:ea typeface="Open Sans" panose="020B0606030504020204" pitchFamily="34" charset="0"/>
+                  <a:cs typeface="Open Sans" panose="020B0606030504020204" pitchFamily="34" charset="0"/>
+                </a:rPr>
+                <a:t>The amount of training data </a:t>
+              </a:r>
+              <a:r>
+                <a:rPr lang="et-EE" sz="5000" dirty="0" smtClean="0">
+                  <a:latin typeface="Open Sans" panose="020B0606030504020204" pitchFamily="34" charset="0"/>
+                  <a:ea typeface="Open Sans" panose="020B0606030504020204" pitchFamily="34" charset="0"/>
+                  <a:cs typeface="Open Sans" panose="020B0606030504020204" pitchFamily="34" charset="0"/>
+                </a:rPr>
+                <a:t>used had </a:t>
+              </a:r>
+              <a:r>
+                <a:rPr lang="et-EE" sz="5000" dirty="0">
+                  <a:latin typeface="Open Sans" panose="020B0606030504020204" pitchFamily="34" charset="0"/>
+                  <a:ea typeface="Open Sans" panose="020B0606030504020204" pitchFamily="34" charset="0"/>
+                  <a:cs typeface="Open Sans" panose="020B0606030504020204" pitchFamily="34" charset="0"/>
+                </a:rPr>
+                <a:t>a small effect on the accuracy</a:t>
+              </a:r>
+              <a:r>
+                <a:rPr lang="et-EE" sz="5000" dirty="0" smtClean="0">
+                  <a:latin typeface="Open Sans" panose="020B0606030504020204" pitchFamily="34" charset="0"/>
+                  <a:ea typeface="Open Sans" panose="020B0606030504020204" pitchFamily="34" charset="0"/>
+                  <a:cs typeface="Open Sans" panose="020B0606030504020204" pitchFamily="34" charset="0"/>
+                </a:rPr>
+                <a:t>.</a:t>
+              </a:r>
+              <a:endParaRPr lang="et-EE" sz="5000" dirty="0">
+                <a:latin typeface="Open Sans" panose="020B0606030504020204" pitchFamily="34" charset="0"/>
+                <a:ea typeface="Open Sans" panose="020B0606030504020204" pitchFamily="34" charset="0"/>
+                <a:cs typeface="Open Sans" panose="020B0606030504020204" pitchFamily="34" charset="0"/>
+              </a:endParaRPr>
+            </a:p>
+            <a:p>
+              <a:pPr algn="just">
+                <a:spcBef>
+                  <a:spcPts val="6000"/>
+                </a:spcBef>
+                <a:spcAft>
+                  <a:spcPts val="2000"/>
+                </a:spcAft>
+              </a:pPr>
+              <a:r>
+                <a:rPr lang="et-EE" sz="7000" dirty="0" smtClean="0">
+                  <a:latin typeface="Open Sans Semibold" panose="020B0706030804020204" pitchFamily="34" charset="0"/>
+                  <a:ea typeface="Open Sans Semibold" panose="020B0706030804020204" pitchFamily="34" charset="0"/>
+                  <a:cs typeface="Open Sans Semibold" panose="020B0706030804020204" pitchFamily="34" charset="0"/>
+                </a:rPr>
+                <a:t>Predicting age</a:t>
+              </a:r>
+            </a:p>
+            <a:p>
+              <a:pPr algn="just"/>
+              <a:r>
+                <a:rPr lang="en-US" sz="5000" dirty="0">
+                  <a:latin typeface="Open Sans" panose="020B0606030504020204" pitchFamily="34" charset="0"/>
+                  <a:ea typeface="Open Sans" panose="020B0606030504020204" pitchFamily="34" charset="0"/>
+                  <a:cs typeface="Open Sans" panose="020B0606030504020204" pitchFamily="34" charset="0"/>
+                </a:rPr>
+                <a:t>Three different methods were </a:t>
+              </a:r>
+              <a:r>
+                <a:rPr lang="en-US" sz="5000" dirty="0" smtClean="0">
+                  <a:latin typeface="Open Sans" panose="020B0606030504020204" pitchFamily="34" charset="0"/>
+                  <a:ea typeface="Open Sans" panose="020B0606030504020204" pitchFamily="34" charset="0"/>
+                  <a:cs typeface="Open Sans" panose="020B0606030504020204" pitchFamily="34" charset="0"/>
+                </a:rPr>
+                <a:t>tested</a:t>
+              </a:r>
+              <a:r>
+                <a:rPr lang="et-EE" sz="5000" dirty="0" smtClean="0">
+                  <a:latin typeface="Open Sans" panose="020B0606030504020204" pitchFamily="34" charset="0"/>
+                  <a:ea typeface="Open Sans" panose="020B0606030504020204" pitchFamily="34" charset="0"/>
+                  <a:cs typeface="Open Sans" panose="020B0606030504020204" pitchFamily="34" charset="0"/>
+                </a:rPr>
+                <a:t>: </a:t>
+              </a:r>
+              <a:r>
+                <a:rPr lang="en-US" sz="5000" dirty="0" smtClean="0">
+                  <a:latin typeface="Open Sans" panose="020B0606030504020204" pitchFamily="34" charset="0"/>
+                  <a:ea typeface="Open Sans" panose="020B0606030504020204" pitchFamily="34" charset="0"/>
+                  <a:cs typeface="Open Sans" panose="020B0606030504020204" pitchFamily="34" charset="0"/>
+                </a:rPr>
+                <a:t>SVM</a:t>
+              </a:r>
+              <a:r>
+                <a:rPr lang="et-EE" sz="5000" dirty="0" smtClean="0">
+                  <a:latin typeface="Open Sans" panose="020B0606030504020204" pitchFamily="34" charset="0"/>
+                  <a:ea typeface="Open Sans" panose="020B0606030504020204" pitchFamily="34" charset="0"/>
+                  <a:cs typeface="Open Sans" panose="020B0606030504020204" pitchFamily="34" charset="0"/>
+                </a:rPr>
+                <a:t>s</a:t>
+              </a:r>
+              <a:r>
+                <a:rPr lang="en-US" sz="5000" dirty="0" smtClean="0">
+                  <a:latin typeface="Open Sans" panose="020B0606030504020204" pitchFamily="34" charset="0"/>
+                  <a:ea typeface="Open Sans" panose="020B0606030504020204" pitchFamily="34" charset="0"/>
+                  <a:cs typeface="Open Sans" panose="020B0606030504020204" pitchFamily="34" charset="0"/>
+                </a:rPr>
+                <a:t>,</a:t>
+              </a:r>
+              <a:r>
+                <a:rPr lang="et-EE" sz="5000" dirty="0" smtClean="0">
+                  <a:latin typeface="Open Sans" panose="020B0606030504020204" pitchFamily="34" charset="0"/>
+                  <a:ea typeface="Open Sans" panose="020B0606030504020204" pitchFamily="34" charset="0"/>
+                  <a:cs typeface="Open Sans" panose="020B0606030504020204" pitchFamily="34" charset="0"/>
+                </a:rPr>
+                <a:t> </a:t>
+              </a:r>
+              <a:r>
+                <a:rPr lang="en-US" sz="5000" dirty="0" smtClean="0">
+                  <a:latin typeface="Open Sans" panose="020B0606030504020204" pitchFamily="34" charset="0"/>
+                  <a:ea typeface="Open Sans" panose="020B0606030504020204" pitchFamily="34" charset="0"/>
+                  <a:cs typeface="Open Sans" panose="020B0606030504020204" pitchFamily="34" charset="0"/>
+                </a:rPr>
+                <a:t>DB</a:t>
+              </a:r>
+              <a:r>
+                <a:rPr lang="et-EE" sz="5000" dirty="0" smtClean="0">
+                  <a:latin typeface="Open Sans" panose="020B0606030504020204" pitchFamily="34" charset="0"/>
+                  <a:ea typeface="Open Sans" panose="020B0606030504020204" pitchFamily="34" charset="0"/>
+                  <a:cs typeface="Open Sans" panose="020B0606030504020204" pitchFamily="34" charset="0"/>
+                </a:rPr>
+                <a:t>SCAN and </a:t>
+              </a:r>
+              <a:r>
+                <a:rPr lang="et-EE" sz="5000" dirty="0">
+                  <a:latin typeface="Open Sans" panose="020B0606030504020204" pitchFamily="34" charset="0"/>
+                  <a:ea typeface="Open Sans" panose="020B0606030504020204" pitchFamily="34" charset="0"/>
+                  <a:cs typeface="Open Sans" panose="020B0606030504020204" pitchFamily="34" charset="0"/>
+                </a:rPr>
+                <a:t>SV</a:t>
+              </a:r>
+              <a:r>
+                <a:rPr lang="en-US" sz="5000" dirty="0" smtClean="0">
+                  <a:latin typeface="Open Sans" panose="020B0606030504020204" pitchFamily="34" charset="0"/>
+                  <a:ea typeface="Open Sans" panose="020B0606030504020204" pitchFamily="34" charset="0"/>
+                  <a:cs typeface="Open Sans" panose="020B0606030504020204" pitchFamily="34" charset="0"/>
+                </a:rPr>
+                <a:t>-regression.</a:t>
               </a:r>
               <a:endParaRPr lang="et-EE" sz="5000" dirty="0" smtClean="0">
                 <a:latin typeface="Open Sans" panose="020B0606030504020204" pitchFamily="34" charset="0"/>
@@ -4297,14 +4953,58 @@
               </a:endParaRPr>
             </a:p>
             <a:p>
-              <a:pPr algn="just"/>
+              <a:pPr algn="just">
+                <a:spcBef>
+                  <a:spcPts val="2000"/>
+                </a:spcBef>
+              </a:pPr>
+              <a:r>
+                <a:rPr lang="en-US" sz="5000" dirty="0" smtClean="0">
+                  <a:latin typeface="Open Sans" panose="020B0606030504020204" pitchFamily="34" charset="0"/>
+                  <a:ea typeface="Open Sans" panose="020B0606030504020204" pitchFamily="34" charset="0"/>
+                  <a:cs typeface="Open Sans" panose="020B0606030504020204" pitchFamily="34" charset="0"/>
+                </a:rPr>
+                <a:t>SVM </a:t>
+              </a:r>
+              <a:r>
+                <a:rPr lang="en-US" sz="5000" dirty="0">
+                  <a:latin typeface="Open Sans" panose="020B0606030504020204" pitchFamily="34" charset="0"/>
+                  <a:ea typeface="Open Sans" panose="020B0606030504020204" pitchFamily="34" charset="0"/>
+                  <a:cs typeface="Open Sans" panose="020B0606030504020204" pitchFamily="34" charset="0"/>
+                </a:rPr>
+                <a:t>produced near-random </a:t>
+              </a:r>
+              <a:r>
+                <a:rPr lang="en-US" sz="5000" dirty="0" smtClean="0">
+                  <a:latin typeface="Open Sans" panose="020B0606030504020204" pitchFamily="34" charset="0"/>
+                  <a:ea typeface="Open Sans" panose="020B0606030504020204" pitchFamily="34" charset="0"/>
+                  <a:cs typeface="Open Sans" panose="020B0606030504020204" pitchFamily="34" charset="0"/>
+                </a:rPr>
+                <a:t>results</a:t>
+              </a:r>
               <a:r>
                 <a:rPr lang="et-EE" sz="5000" dirty="0" smtClean="0">
                   <a:latin typeface="Open Sans" panose="020B0606030504020204" pitchFamily="34" charset="0"/>
                   <a:ea typeface="Open Sans" panose="020B0606030504020204" pitchFamily="34" charset="0"/>
                   <a:cs typeface="Open Sans" panose="020B0606030504020204" pitchFamily="34" charset="0"/>
                 </a:rPr>
-                <a:t>The </a:t>
+                <a:t> that were not affected</a:t>
+              </a:r>
+              <a:r>
+                <a:rPr lang="en-US" sz="5000" dirty="0" smtClean="0">
+                  <a:latin typeface="Open Sans" panose="020B0606030504020204" pitchFamily="34" charset="0"/>
+                  <a:ea typeface="Open Sans" panose="020B0606030504020204" pitchFamily="34" charset="0"/>
+                  <a:cs typeface="Open Sans" panose="020B0606030504020204" pitchFamily="34" charset="0"/>
+                </a:rPr>
+                <a:t> </a:t>
+              </a:r>
+              <a:r>
+                <a:rPr lang="en-US" sz="5000" dirty="0">
+                  <a:latin typeface="Open Sans" panose="020B0606030504020204" pitchFamily="34" charset="0"/>
+                  <a:ea typeface="Open Sans" panose="020B0606030504020204" pitchFamily="34" charset="0"/>
+                  <a:cs typeface="Open Sans" panose="020B0606030504020204" pitchFamily="34" charset="0"/>
+                </a:rPr>
+                <a:t>by </a:t>
               </a:r>
               <a:r>
                 <a:rPr lang="et-EE" sz="5000" dirty="0" smtClean="0">
@@ -4312,7 +5012,47 @@
                   <a:ea typeface="Open Sans" panose="020B0606030504020204" pitchFamily="34" charset="0"/>
                   <a:cs typeface="Open Sans" panose="020B0606030504020204" pitchFamily="34" charset="0"/>
                 </a:rPr>
-                <a:t>original diagnosis histories, given </a:t>
+                <a:t>choice of</a:t>
+              </a:r>
+              <a:r>
+                <a:rPr lang="en-US" sz="5000" dirty="0" smtClean="0">
+                  <a:latin typeface="Open Sans" panose="020B0606030504020204" pitchFamily="34" charset="0"/>
+                  <a:ea typeface="Open Sans" panose="020B0606030504020204" pitchFamily="34" charset="0"/>
+                  <a:cs typeface="Open Sans" panose="020B0606030504020204" pitchFamily="34" charset="0"/>
+                </a:rPr>
+                <a:t> </a:t>
+              </a:r>
+              <a:r>
+                <a:rPr lang="en-US" sz="5000" dirty="0">
+                  <a:latin typeface="Open Sans" panose="020B0606030504020204" pitchFamily="34" charset="0"/>
+                  <a:ea typeface="Open Sans" panose="020B0606030504020204" pitchFamily="34" charset="0"/>
+                  <a:cs typeface="Open Sans" panose="020B0606030504020204" pitchFamily="34" charset="0"/>
+                </a:rPr>
+                <a:t>kernel </a:t>
+              </a:r>
+              <a:r>
+                <a:rPr lang="en-US" sz="5000" dirty="0" smtClean="0">
+                  <a:latin typeface="Open Sans" panose="020B0606030504020204" pitchFamily="34" charset="0"/>
+                  <a:ea typeface="Open Sans" panose="020B0606030504020204" pitchFamily="34" charset="0"/>
+                  <a:cs typeface="Open Sans" panose="020B0606030504020204" pitchFamily="34" charset="0"/>
+                </a:rPr>
+                <a:t>or parameters</a:t>
+              </a:r>
+              <a:r>
+                <a:rPr lang="en-US" sz="5000" dirty="0">
+                  <a:latin typeface="Open Sans" panose="020B0606030504020204" pitchFamily="34" charset="0"/>
+                  <a:ea typeface="Open Sans" panose="020B0606030504020204" pitchFamily="34" charset="0"/>
+                  <a:cs typeface="Open Sans" panose="020B0606030504020204" pitchFamily="34" charset="0"/>
+                </a:rPr>
+                <a:t>. </a:t>
+              </a:r>
+              <a:r>
+                <a:rPr lang="en-US" sz="5000" dirty="0" smtClean="0">
+                  <a:latin typeface="Open Sans" panose="020B0606030504020204" pitchFamily="34" charset="0"/>
+                  <a:ea typeface="Open Sans" panose="020B0606030504020204" pitchFamily="34" charset="0"/>
+                  <a:cs typeface="Open Sans" panose="020B0606030504020204" pitchFamily="34" charset="0"/>
+                </a:rPr>
+                <a:t>DBS</a:t>
               </a:r>
               <a:r>
                 <a:rPr lang="et-EE" sz="5000" dirty="0" smtClean="0">
@@ -4320,7 +5060,15 @@
                   <a:ea typeface="Open Sans" panose="020B0606030504020204" pitchFamily="34" charset="0"/>
                   <a:cs typeface="Open Sans" panose="020B0606030504020204" pitchFamily="34" charset="0"/>
                 </a:rPr>
-                <a:t>as lists of </a:t>
+                <a:t>CAN</a:t>
+              </a:r>
+              <a:r>
+                <a:rPr lang="en-US" sz="5000" dirty="0" smtClean="0">
+                  <a:latin typeface="Open Sans" panose="020B0606030504020204" pitchFamily="34" charset="0"/>
+                  <a:ea typeface="Open Sans" panose="020B0606030504020204" pitchFamily="34" charset="0"/>
+                  <a:cs typeface="Open Sans" panose="020B0606030504020204" pitchFamily="34" charset="0"/>
+                </a:rPr>
+                <a:t> </a:t>
               </a:r>
               <a:r>
                 <a:rPr lang="et-EE" sz="5000" dirty="0" smtClean="0">
@@ -4328,42 +5076,91 @@
                   <a:ea typeface="Open Sans" panose="020B0606030504020204" pitchFamily="34" charset="0"/>
                   <a:cs typeface="Open Sans" panose="020B0606030504020204" pitchFamily="34" charset="0"/>
                 </a:rPr>
-                <a:t>Estonian RHK-10 codes, were binned by removing one level of specificity from the codes (e.g. </a:t>
-              </a:r>
-              <a:r>
-                <a:rPr lang="et-EE" sz="5000" dirty="0" smtClean="0">
-                  <a:latin typeface="Open Sans" panose="020B0606030504020204" pitchFamily="34" charset="0"/>
-                  <a:ea typeface="Open Sans" panose="020B0606030504020204" pitchFamily="34" charset="0"/>
-                  <a:cs typeface="Open Sans" panose="020B0606030504020204" pitchFamily="34" charset="0"/>
-                </a:rPr>
-                <a:t>‘G01.8’ </a:t>
-              </a:r>
-              <a:r>
-                <a:rPr lang="et-EE" sz="5000" dirty="0" smtClean="0">
-                  <a:latin typeface="Open Sans" panose="020B0606030504020204" pitchFamily="34" charset="0"/>
-                  <a:ea typeface="Open Sans" panose="020B0606030504020204" pitchFamily="34" charset="0"/>
-                  <a:cs typeface="Open Sans" panose="020B0606030504020204" pitchFamily="34" charset="0"/>
-                </a:rPr>
-                <a:t>was mapped </a:t>
-              </a:r>
-              <a:r>
-                <a:rPr lang="et-EE" sz="5000" dirty="0" smtClean="0">
-                  <a:latin typeface="Open Sans" panose="020B0606030504020204" pitchFamily="34" charset="0"/>
-                  <a:ea typeface="Open Sans" panose="020B0606030504020204" pitchFamily="34" charset="0"/>
-                  <a:cs typeface="Open Sans" panose="020B0606030504020204" pitchFamily="34" charset="0"/>
-                </a:rPr>
-                <a:t>to ‘G01’), and transformed into a binary vector discarding the number of times each diagnosis occurred.</a:t>
-              </a:r>
+                <a:t>only </a:t>
+              </a:r>
+              <a:r>
+                <a:rPr lang="en-US" sz="5000" dirty="0" smtClean="0">
+                  <a:latin typeface="Open Sans" panose="020B0606030504020204" pitchFamily="34" charset="0"/>
+                  <a:ea typeface="Open Sans" panose="020B0606030504020204" pitchFamily="34" charset="0"/>
+                  <a:cs typeface="Open Sans" panose="020B0606030504020204" pitchFamily="34" charset="0"/>
+                </a:rPr>
+                <a:t>found </a:t>
+              </a:r>
+              <a:r>
+                <a:rPr lang="en-US" sz="5000" dirty="0">
+                  <a:latin typeface="Open Sans" panose="020B0606030504020204" pitchFamily="34" charset="0"/>
+                  <a:ea typeface="Open Sans" panose="020B0606030504020204" pitchFamily="34" charset="0"/>
+                  <a:cs typeface="Open Sans" panose="020B0606030504020204" pitchFamily="34" charset="0"/>
+                </a:rPr>
+                <a:t>two clusters out of the expected </a:t>
+              </a:r>
+              <a:r>
+                <a:rPr lang="en-US" sz="5000" dirty="0" smtClean="0">
+                  <a:latin typeface="Open Sans" panose="020B0606030504020204" pitchFamily="34" charset="0"/>
+                  <a:ea typeface="Open Sans" panose="020B0606030504020204" pitchFamily="34" charset="0"/>
+                  <a:cs typeface="Open Sans" panose="020B0606030504020204" pitchFamily="34" charset="0"/>
+                </a:rPr>
+                <a:t>8.</a:t>
+              </a:r>
+              <a:endParaRPr lang="et-EE" sz="5000" dirty="0" smtClean="0">
+                <a:latin typeface="Open Sans" panose="020B0606030504020204" pitchFamily="34" charset="0"/>
+                <a:ea typeface="Open Sans" panose="020B0606030504020204" pitchFamily="34" charset="0"/>
+                <a:cs typeface="Open Sans" panose="020B0606030504020204" pitchFamily="34" charset="0"/>
+              </a:endParaRPr>
             </a:p>
             <a:p>
-              <a:pPr algn="just"/>
+              <a:pPr algn="just">
+                <a:spcBef>
+                  <a:spcPts val="2000"/>
+                </a:spcBef>
+              </a:pPr>
               <a:r>
                 <a:rPr lang="et-EE" sz="5000" dirty="0" smtClean="0">
                   <a:latin typeface="Open Sans" panose="020B0606030504020204" pitchFamily="34" charset="0"/>
                   <a:ea typeface="Open Sans" panose="020B0606030504020204" pitchFamily="34" charset="0"/>
                   <a:cs typeface="Open Sans" panose="020B0606030504020204" pitchFamily="34" charset="0"/>
                 </a:rPr>
-                <a:t>After preprocessing, a sample of 48 728 patients was left. This data was partitioned into training (60%), validation (20%) and test (20%) sets.</a:t>
+                <a:t>SV</a:t>
+              </a:r>
+              <a:r>
+                <a:rPr lang="en-US" sz="5000" dirty="0" smtClean="0">
+                  <a:latin typeface="Open Sans" panose="020B0606030504020204" pitchFamily="34" charset="0"/>
+                  <a:ea typeface="Open Sans" panose="020B0606030504020204" pitchFamily="34" charset="0"/>
+                  <a:cs typeface="Open Sans" panose="020B0606030504020204" pitchFamily="34" charset="0"/>
+                </a:rPr>
+                <a:t>-regression</a:t>
+              </a:r>
+              <a:r>
+                <a:rPr lang="et-EE" sz="5000" dirty="0" smtClean="0">
+                  <a:latin typeface="Open Sans" panose="020B0606030504020204" pitchFamily="34" charset="0"/>
+                  <a:ea typeface="Open Sans" panose="020B0606030504020204" pitchFamily="34" charset="0"/>
+                  <a:cs typeface="Open Sans" panose="020B0606030504020204" pitchFamily="34" charset="0"/>
+                </a:rPr>
+                <a:t> achieved a test set accuracy of </a:t>
+              </a:r>
+              <a:r>
+                <a:rPr lang="en-US" sz="5000" b="1" dirty="0" smtClean="0">
+                  <a:latin typeface="Open Sans" panose="020B0606030504020204" pitchFamily="34" charset="0"/>
+                  <a:ea typeface="Open Sans" panose="020B0606030504020204" pitchFamily="34" charset="0"/>
+                  <a:cs typeface="Open Sans" panose="020B0606030504020204" pitchFamily="34" charset="0"/>
+                </a:rPr>
+                <a:t>35%</a:t>
+              </a:r>
+              <a:r>
+                <a:rPr lang="et-EE" sz="5000" dirty="0">
+                  <a:latin typeface="Open Sans" panose="020B0606030504020204" pitchFamily="34" charset="0"/>
+                  <a:ea typeface="Open Sans" panose="020B0606030504020204" pitchFamily="34" charset="0"/>
+                  <a:cs typeface="Open Sans" panose="020B0606030504020204" pitchFamily="34" charset="0"/>
+                </a:rPr>
+                <a:t> </a:t>
+              </a:r>
+              <a:r>
+                <a:rPr lang="et-EE" sz="5000" dirty="0" smtClean="0">
+                  <a:latin typeface="Open Sans" panose="020B0606030504020204" pitchFamily="34" charset="0"/>
+                  <a:ea typeface="Open Sans" panose="020B0606030504020204" pitchFamily="34" charset="0"/>
+                  <a:cs typeface="Open Sans" panose="020B0606030504020204" pitchFamily="34" charset="0"/>
+                </a:rPr>
+                <a:t>compared to a naive prediction accuracy of 23%.</a:t>
               </a:r>
               <a:endParaRPr lang="et-EE" sz="5000" dirty="0">
                 <a:latin typeface="Open Sans" panose="020B0606030504020204" pitchFamily="34" charset="0"/>
@@ -4374,6 +5171,84 @@
           </p:txBody>
         </p:sp>
       </p:grpSp>
+      <p:graphicFrame>
+        <p:nvGraphicFramePr>
+          <p:cNvPr id="23" name="Chart 22"/>
+          <p:cNvGraphicFramePr>
+            <a:graphicFrameLocks/>
+          </p:cNvGraphicFramePr>
+          <p:nvPr>
+            <p:extLst>
+              <p:ext uri="{D42A27DB-BD31-4B8C-83A1-F6EECF244321}">
+                <p14:modId xmlns:p14="http://schemas.microsoft.com/office/powerpoint/2010/main" val="1945076939"/>
+              </p:ext>
+            </p:extLst>
+          </p:nvPr>
+        </p:nvGraphicFramePr>
+        <p:xfrm>
+          <a:off x="28649679" y="20397787"/>
+          <a:ext cx="13488921" cy="7276133"/>
+        </p:xfrm>
+        <a:graphic>
+          <a:graphicData uri="http://schemas.openxmlformats.org/drawingml/2006/chart">
+            <c:chart xmlns:c="http://schemas.openxmlformats.org/drawingml/2006/chart" xmlns:r="http://schemas.openxmlformats.org/officeDocument/2006/relationships" r:id="rId5"/>
+          </a:graphicData>
+        </a:graphic>
+      </p:graphicFrame>
+      <p:sp>
+        <p:nvSpPr>
+          <p:cNvPr id="2" name="TextBox 1"/>
+          <p:cNvSpPr txBox="1"/>
+          <p:nvPr/>
+        </p:nvSpPr>
+        <p:spPr>
+          <a:xfrm>
+            <a:off x="28649679" y="27675768"/>
+            <a:ext cx="13480984" cy="1169551"/>
+          </a:xfrm>
+          <a:prstGeom prst="rect">
+            <a:avLst/>
+          </a:prstGeom>
+          <a:noFill/>
+        </p:spPr>
+        <p:txBody>
+          <a:bodyPr wrap="square" rtlCol="0">
+            <a:spAutoFit/>
+          </a:bodyPr>
+          <a:lstStyle/>
+          <a:p>
+            <a:r>
+              <a:rPr lang="et-EE" sz="3500" b="1" dirty="0" smtClean="0">
+                <a:latin typeface="Open Sans" panose="020B0606030504020204" pitchFamily="34" charset="0"/>
+                <a:ea typeface="Open Sans" panose="020B0606030504020204" pitchFamily="34" charset="0"/>
+                <a:cs typeface="Open Sans" panose="020B0606030504020204" pitchFamily="34" charset="0"/>
+              </a:rPr>
+              <a:t>Figure 1</a:t>
+            </a:r>
+            <a:r>
+              <a:rPr lang="et-EE" sz="3500" b="1" dirty="0">
+                <a:latin typeface="Open Sans" panose="020B0606030504020204" pitchFamily="34" charset="0"/>
+                <a:ea typeface="Open Sans" panose="020B0606030504020204" pitchFamily="34" charset="0"/>
+                <a:cs typeface="Open Sans" panose="020B0606030504020204" pitchFamily="34" charset="0"/>
+              </a:rPr>
+              <a:t>.</a:t>
+            </a:r>
+            <a:r>
+              <a:rPr lang="et-EE" sz="3500" dirty="0" smtClean="0">
+                <a:latin typeface="Open Sans" panose="020B0606030504020204" pitchFamily="34" charset="0"/>
+                <a:ea typeface="Open Sans" panose="020B0606030504020204" pitchFamily="34" charset="0"/>
+                <a:cs typeface="Open Sans" panose="020B0606030504020204" pitchFamily="34" charset="0"/>
+              </a:rPr>
+              <a:t> Distribution of diagnosis counts among patients after filtering and preprocessing.</a:t>
+            </a:r>
+            <a:endParaRPr lang="et-EE" sz="3500" dirty="0">
+              <a:latin typeface="Open Sans" panose="020B0606030504020204" pitchFamily="34" charset="0"/>
+              <a:ea typeface="Open Sans" panose="020B0606030504020204" pitchFamily="34" charset="0"/>
+              <a:cs typeface="Open Sans" panose="020B0606030504020204" pitchFamily="34" charset="0"/>
+            </a:endParaRPr>
+          </a:p>
+        </p:txBody>
+      </p:sp>
     </p:spTree>
     <p:extLst>
       <p:ext uri="{BB962C8B-B14F-4D97-AF65-F5344CB8AC3E}">

</xml_diff>